<commit_message>
updated documentation and unit tests
</commit_message>
<xml_diff>
--- a/Misc files/Documentation-Diagrams-2.pptx
+++ b/Misc files/Documentation-Diagrams-2.pptx
@@ -292,7 +292,7 @@
             <a:fld id="{E6E0A79A-9041-4DA8-9D99-85099689D23E}" type="datetimeFigureOut">
               <a:rPr lang="de-DE" smtClean="0"/>
               <a:pPr/>
-              <a:t>12.10.2009</a:t>
+              <a:t>13.10.2009</a:t>
             </a:fld>
             <a:endParaRPr lang="de-DE"/>
           </a:p>
@@ -459,7 +459,7 @@
             <a:fld id="{E6E0A79A-9041-4DA8-9D99-85099689D23E}" type="datetimeFigureOut">
               <a:rPr lang="de-DE" smtClean="0"/>
               <a:pPr/>
-              <a:t>12.10.2009</a:t>
+              <a:t>13.10.2009</a:t>
             </a:fld>
             <a:endParaRPr lang="de-DE"/>
           </a:p>
@@ -636,7 +636,7 @@
             <a:fld id="{E6E0A79A-9041-4DA8-9D99-85099689D23E}" type="datetimeFigureOut">
               <a:rPr lang="de-DE" smtClean="0"/>
               <a:pPr/>
-              <a:t>12.10.2009</a:t>
+              <a:t>13.10.2009</a:t>
             </a:fld>
             <a:endParaRPr lang="de-DE"/>
           </a:p>
@@ -803,7 +803,7 @@
             <a:fld id="{E6E0A79A-9041-4DA8-9D99-85099689D23E}" type="datetimeFigureOut">
               <a:rPr lang="de-DE" smtClean="0"/>
               <a:pPr/>
-              <a:t>12.10.2009</a:t>
+              <a:t>13.10.2009</a:t>
             </a:fld>
             <a:endParaRPr lang="de-DE"/>
           </a:p>
@@ -1046,7 +1046,7 @@
             <a:fld id="{E6E0A79A-9041-4DA8-9D99-85099689D23E}" type="datetimeFigureOut">
               <a:rPr lang="de-DE" smtClean="0"/>
               <a:pPr/>
-              <a:t>12.10.2009</a:t>
+              <a:t>13.10.2009</a:t>
             </a:fld>
             <a:endParaRPr lang="de-DE"/>
           </a:p>
@@ -1331,7 +1331,7 @@
             <a:fld id="{E6E0A79A-9041-4DA8-9D99-85099689D23E}" type="datetimeFigureOut">
               <a:rPr lang="de-DE" smtClean="0"/>
               <a:pPr/>
-              <a:t>12.10.2009</a:t>
+              <a:t>13.10.2009</a:t>
             </a:fld>
             <a:endParaRPr lang="de-DE"/>
           </a:p>
@@ -1750,7 +1750,7 @@
             <a:fld id="{E6E0A79A-9041-4DA8-9D99-85099689D23E}" type="datetimeFigureOut">
               <a:rPr lang="de-DE" smtClean="0"/>
               <a:pPr/>
-              <a:t>12.10.2009</a:t>
+              <a:t>13.10.2009</a:t>
             </a:fld>
             <a:endParaRPr lang="de-DE"/>
           </a:p>
@@ -1865,7 +1865,7 @@
             <a:fld id="{E6E0A79A-9041-4DA8-9D99-85099689D23E}" type="datetimeFigureOut">
               <a:rPr lang="de-DE" smtClean="0"/>
               <a:pPr/>
-              <a:t>12.10.2009</a:t>
+              <a:t>13.10.2009</a:t>
             </a:fld>
             <a:endParaRPr lang="de-DE"/>
           </a:p>
@@ -1957,7 +1957,7 @@
             <a:fld id="{E6E0A79A-9041-4DA8-9D99-85099689D23E}" type="datetimeFigureOut">
               <a:rPr lang="de-DE" smtClean="0"/>
               <a:pPr/>
-              <a:t>12.10.2009</a:t>
+              <a:t>13.10.2009</a:t>
             </a:fld>
             <a:endParaRPr lang="de-DE"/>
           </a:p>
@@ -2231,7 +2231,7 @@
             <a:fld id="{E6E0A79A-9041-4DA8-9D99-85099689D23E}" type="datetimeFigureOut">
               <a:rPr lang="de-DE" smtClean="0"/>
               <a:pPr/>
-              <a:t>12.10.2009</a:t>
+              <a:t>13.10.2009</a:t>
             </a:fld>
             <a:endParaRPr lang="de-DE"/>
           </a:p>
@@ -2481,7 +2481,7 @@
             <a:fld id="{E6E0A79A-9041-4DA8-9D99-85099689D23E}" type="datetimeFigureOut">
               <a:rPr lang="de-DE" smtClean="0"/>
               <a:pPr/>
-              <a:t>12.10.2009</a:t>
+              <a:t>13.10.2009</a:t>
             </a:fld>
             <a:endParaRPr lang="de-DE"/>
           </a:p>
@@ -2691,7 +2691,7 @@
             <a:fld id="{E6E0A79A-9041-4DA8-9D99-85099689D23E}" type="datetimeFigureOut">
               <a:rPr lang="de-DE" smtClean="0"/>
               <a:pPr/>
-              <a:t>12.10.2009</a:t>
+              <a:t>13.10.2009</a:t>
             </a:fld>
             <a:endParaRPr lang="de-DE"/>
           </a:p>
@@ -4446,792 +4446,6 @@
           </a:fontRef>
         </p:style>
       </p:cxnSp>
-      <p:sp>
-        <p:nvSpPr>
-          <p:cNvPr id="21" name="Freihandform 20"/>
-          <p:cNvSpPr/>
-          <p:nvPr/>
-        </p:nvSpPr>
-        <p:spPr>
-          <a:xfrm>
-            <a:off x="3571868" y="1071546"/>
-            <a:ext cx="1581150" cy="1013572"/>
-          </a:xfrm>
-          <a:custGeom>
-            <a:avLst/>
-            <a:gdLst>
-              <a:gd name="connsiteX0" fmla="*/ 342900 w 1581150"/>
-              <a:gd name="connsiteY0" fmla="*/ 203947 h 1013572"/>
-              <a:gd name="connsiteX1" fmla="*/ 342900 w 1581150"/>
-              <a:gd name="connsiteY1" fmla="*/ 203947 h 1013572"/>
-              <a:gd name="connsiteX2" fmla="*/ 66675 w 1581150"/>
-              <a:gd name="connsiteY2" fmla="*/ 194422 h 1013572"/>
-              <a:gd name="connsiteX3" fmla="*/ 57150 w 1581150"/>
-              <a:gd name="connsiteY3" fmla="*/ 222997 h 1013572"/>
-              <a:gd name="connsiteX4" fmla="*/ 28575 w 1581150"/>
-              <a:gd name="connsiteY4" fmla="*/ 261097 h 1013572"/>
-              <a:gd name="connsiteX5" fmla="*/ 38100 w 1581150"/>
-              <a:gd name="connsiteY5" fmla="*/ 461122 h 1013572"/>
-              <a:gd name="connsiteX6" fmla="*/ 57150 w 1581150"/>
-              <a:gd name="connsiteY6" fmla="*/ 518272 h 1013572"/>
-              <a:gd name="connsiteX7" fmla="*/ 66675 w 1581150"/>
-              <a:gd name="connsiteY7" fmla="*/ 546847 h 1013572"/>
-              <a:gd name="connsiteX8" fmla="*/ 95250 w 1581150"/>
-              <a:gd name="connsiteY8" fmla="*/ 565897 h 1013572"/>
-              <a:gd name="connsiteX9" fmla="*/ 57150 w 1581150"/>
-              <a:gd name="connsiteY9" fmla="*/ 584947 h 1013572"/>
-              <a:gd name="connsiteX10" fmla="*/ 47625 w 1581150"/>
-              <a:gd name="connsiteY10" fmla="*/ 613522 h 1013572"/>
-              <a:gd name="connsiteX11" fmla="*/ 28575 w 1581150"/>
-              <a:gd name="connsiteY11" fmla="*/ 642097 h 1013572"/>
-              <a:gd name="connsiteX12" fmla="*/ 9525 w 1581150"/>
-              <a:gd name="connsiteY12" fmla="*/ 699247 h 1013572"/>
-              <a:gd name="connsiteX13" fmla="*/ 0 w 1581150"/>
-              <a:gd name="connsiteY13" fmla="*/ 727822 h 1013572"/>
-              <a:gd name="connsiteX14" fmla="*/ 9525 w 1581150"/>
-              <a:gd name="connsiteY14" fmla="*/ 756397 h 1013572"/>
-              <a:gd name="connsiteX15" fmla="*/ 19050 w 1581150"/>
-              <a:gd name="connsiteY15" fmla="*/ 804022 h 1013572"/>
-              <a:gd name="connsiteX16" fmla="*/ 57150 w 1581150"/>
-              <a:gd name="connsiteY16" fmla="*/ 861172 h 1013572"/>
-              <a:gd name="connsiteX17" fmla="*/ 104775 w 1581150"/>
-              <a:gd name="connsiteY17" fmla="*/ 908797 h 1013572"/>
-              <a:gd name="connsiteX18" fmla="*/ 161925 w 1581150"/>
-              <a:gd name="connsiteY18" fmla="*/ 937372 h 1013572"/>
-              <a:gd name="connsiteX19" fmla="*/ 219075 w 1581150"/>
-              <a:gd name="connsiteY19" fmla="*/ 927847 h 1013572"/>
-              <a:gd name="connsiteX20" fmla="*/ 247650 w 1581150"/>
-              <a:gd name="connsiteY20" fmla="*/ 918322 h 1013572"/>
-              <a:gd name="connsiteX21" fmla="*/ 285750 w 1581150"/>
-              <a:gd name="connsiteY21" fmla="*/ 908797 h 1013572"/>
-              <a:gd name="connsiteX22" fmla="*/ 333375 w 1581150"/>
-              <a:gd name="connsiteY22" fmla="*/ 918322 h 1013572"/>
-              <a:gd name="connsiteX23" fmla="*/ 390525 w 1581150"/>
-              <a:gd name="connsiteY23" fmla="*/ 937372 h 1013572"/>
-              <a:gd name="connsiteX24" fmla="*/ 419100 w 1581150"/>
-              <a:gd name="connsiteY24" fmla="*/ 965947 h 1013572"/>
-              <a:gd name="connsiteX25" fmla="*/ 476250 w 1581150"/>
-              <a:gd name="connsiteY25" fmla="*/ 984997 h 1013572"/>
-              <a:gd name="connsiteX26" fmla="*/ 504825 w 1581150"/>
-              <a:gd name="connsiteY26" fmla="*/ 994522 h 1013572"/>
-              <a:gd name="connsiteX27" fmla="*/ 533400 w 1581150"/>
-              <a:gd name="connsiteY27" fmla="*/ 1004047 h 1013572"/>
-              <a:gd name="connsiteX28" fmla="*/ 609600 w 1581150"/>
-              <a:gd name="connsiteY28" fmla="*/ 1013572 h 1013572"/>
-              <a:gd name="connsiteX29" fmla="*/ 714375 w 1581150"/>
-              <a:gd name="connsiteY29" fmla="*/ 1004047 h 1013572"/>
-              <a:gd name="connsiteX30" fmla="*/ 742950 w 1581150"/>
-              <a:gd name="connsiteY30" fmla="*/ 994522 h 1013572"/>
-              <a:gd name="connsiteX31" fmla="*/ 847725 w 1581150"/>
-              <a:gd name="connsiteY31" fmla="*/ 965947 h 1013572"/>
-              <a:gd name="connsiteX32" fmla="*/ 876300 w 1581150"/>
-              <a:gd name="connsiteY32" fmla="*/ 908797 h 1013572"/>
-              <a:gd name="connsiteX33" fmla="*/ 866775 w 1581150"/>
-              <a:gd name="connsiteY33" fmla="*/ 861172 h 1013572"/>
-              <a:gd name="connsiteX34" fmla="*/ 847725 w 1581150"/>
-              <a:gd name="connsiteY34" fmla="*/ 804022 h 1013572"/>
-              <a:gd name="connsiteX35" fmla="*/ 1152525 w 1581150"/>
-              <a:gd name="connsiteY35" fmla="*/ 784972 h 1013572"/>
-              <a:gd name="connsiteX36" fmla="*/ 1209675 w 1581150"/>
-              <a:gd name="connsiteY36" fmla="*/ 765922 h 1013572"/>
-              <a:gd name="connsiteX37" fmla="*/ 1285875 w 1581150"/>
-              <a:gd name="connsiteY37" fmla="*/ 737347 h 1013572"/>
-              <a:gd name="connsiteX38" fmla="*/ 1304925 w 1581150"/>
-              <a:gd name="connsiteY38" fmla="*/ 708772 h 1013572"/>
-              <a:gd name="connsiteX39" fmla="*/ 1362075 w 1581150"/>
-              <a:gd name="connsiteY39" fmla="*/ 670672 h 1013572"/>
-              <a:gd name="connsiteX40" fmla="*/ 1390650 w 1581150"/>
-              <a:gd name="connsiteY40" fmla="*/ 613522 h 1013572"/>
-              <a:gd name="connsiteX41" fmla="*/ 1400175 w 1581150"/>
-              <a:gd name="connsiteY41" fmla="*/ 584947 h 1013572"/>
-              <a:gd name="connsiteX42" fmla="*/ 1428750 w 1581150"/>
-              <a:gd name="connsiteY42" fmla="*/ 565897 h 1013572"/>
-              <a:gd name="connsiteX43" fmla="*/ 1514475 w 1581150"/>
-              <a:gd name="connsiteY43" fmla="*/ 575422 h 1013572"/>
-              <a:gd name="connsiteX44" fmla="*/ 1543050 w 1581150"/>
-              <a:gd name="connsiteY44" fmla="*/ 556372 h 1013572"/>
-              <a:gd name="connsiteX45" fmla="*/ 1571625 w 1581150"/>
-              <a:gd name="connsiteY45" fmla="*/ 527797 h 1013572"/>
-              <a:gd name="connsiteX46" fmla="*/ 1581150 w 1581150"/>
-              <a:gd name="connsiteY46" fmla="*/ 499222 h 1013572"/>
-              <a:gd name="connsiteX47" fmla="*/ 1562100 w 1581150"/>
-              <a:gd name="connsiteY47" fmla="*/ 356347 h 1013572"/>
-              <a:gd name="connsiteX48" fmla="*/ 1552575 w 1581150"/>
-              <a:gd name="connsiteY48" fmla="*/ 318247 h 1013572"/>
-              <a:gd name="connsiteX49" fmla="*/ 1533525 w 1581150"/>
-              <a:gd name="connsiteY49" fmla="*/ 280147 h 1013572"/>
-              <a:gd name="connsiteX50" fmla="*/ 1514475 w 1581150"/>
-              <a:gd name="connsiteY50" fmla="*/ 222997 h 1013572"/>
-              <a:gd name="connsiteX51" fmla="*/ 1495425 w 1581150"/>
-              <a:gd name="connsiteY51" fmla="*/ 194422 h 1013572"/>
-              <a:gd name="connsiteX52" fmla="*/ 1457325 w 1581150"/>
-              <a:gd name="connsiteY52" fmla="*/ 137272 h 1013572"/>
-              <a:gd name="connsiteX53" fmla="*/ 1438275 w 1581150"/>
-              <a:gd name="connsiteY53" fmla="*/ 108697 h 1013572"/>
-              <a:gd name="connsiteX54" fmla="*/ 1409700 w 1581150"/>
-              <a:gd name="connsiteY54" fmla="*/ 99172 h 1013572"/>
-              <a:gd name="connsiteX55" fmla="*/ 1247775 w 1581150"/>
-              <a:gd name="connsiteY55" fmla="*/ 80122 h 1013572"/>
-              <a:gd name="connsiteX56" fmla="*/ 1219200 w 1581150"/>
-              <a:gd name="connsiteY56" fmla="*/ 61072 h 1013572"/>
-              <a:gd name="connsiteX57" fmla="*/ 1190625 w 1581150"/>
-              <a:gd name="connsiteY57" fmla="*/ 51547 h 1013572"/>
-              <a:gd name="connsiteX58" fmla="*/ 1095375 w 1581150"/>
-              <a:gd name="connsiteY58" fmla="*/ 3922 h 1013572"/>
-              <a:gd name="connsiteX59" fmla="*/ 914400 w 1581150"/>
-              <a:gd name="connsiteY59" fmla="*/ 13447 h 1013572"/>
-              <a:gd name="connsiteX60" fmla="*/ 838200 w 1581150"/>
-              <a:gd name="connsiteY60" fmla="*/ 42022 h 1013572"/>
-              <a:gd name="connsiteX61" fmla="*/ 762000 w 1581150"/>
-              <a:gd name="connsiteY61" fmla="*/ 61072 h 1013572"/>
-              <a:gd name="connsiteX62" fmla="*/ 733425 w 1581150"/>
-              <a:gd name="connsiteY62" fmla="*/ 70597 h 1013572"/>
-              <a:gd name="connsiteX63" fmla="*/ 676275 w 1581150"/>
-              <a:gd name="connsiteY63" fmla="*/ 99172 h 1013572"/>
-              <a:gd name="connsiteX64" fmla="*/ 666750 w 1581150"/>
-              <a:gd name="connsiteY64" fmla="*/ 127747 h 1013572"/>
-              <a:gd name="connsiteX65" fmla="*/ 609600 w 1581150"/>
-              <a:gd name="connsiteY65" fmla="*/ 108697 h 1013572"/>
-              <a:gd name="connsiteX66" fmla="*/ 571500 w 1581150"/>
-              <a:gd name="connsiteY66" fmla="*/ 51547 h 1013572"/>
-              <a:gd name="connsiteX67" fmla="*/ 552450 w 1581150"/>
-              <a:gd name="connsiteY67" fmla="*/ 22972 h 1013572"/>
-              <a:gd name="connsiteX68" fmla="*/ 523875 w 1581150"/>
-              <a:gd name="connsiteY68" fmla="*/ 13447 h 1013572"/>
-              <a:gd name="connsiteX69" fmla="*/ 400050 w 1581150"/>
-              <a:gd name="connsiteY69" fmla="*/ 32497 h 1013572"/>
-              <a:gd name="connsiteX70" fmla="*/ 342900 w 1581150"/>
-              <a:gd name="connsiteY70" fmla="*/ 51547 h 1013572"/>
-              <a:gd name="connsiteX71" fmla="*/ 285750 w 1581150"/>
-              <a:gd name="connsiteY71" fmla="*/ 80122 h 1013572"/>
-              <a:gd name="connsiteX72" fmla="*/ 285750 w 1581150"/>
-              <a:gd name="connsiteY72" fmla="*/ 156322 h 1013572"/>
-              <a:gd name="connsiteX73" fmla="*/ 342900 w 1581150"/>
-              <a:gd name="connsiteY73" fmla="*/ 203947 h 1013572"/>
-            </a:gdLst>
-            <a:ahLst/>
-            <a:cxnLst>
-              <a:cxn ang="0">
-                <a:pos x="connsiteX0" y="connsiteY0"/>
-              </a:cxn>
-              <a:cxn ang="0">
-                <a:pos x="connsiteX1" y="connsiteY1"/>
-              </a:cxn>
-              <a:cxn ang="0">
-                <a:pos x="connsiteX2" y="connsiteY2"/>
-              </a:cxn>
-              <a:cxn ang="0">
-                <a:pos x="connsiteX3" y="connsiteY3"/>
-              </a:cxn>
-              <a:cxn ang="0">
-                <a:pos x="connsiteX4" y="connsiteY4"/>
-              </a:cxn>
-              <a:cxn ang="0">
-                <a:pos x="connsiteX5" y="connsiteY5"/>
-              </a:cxn>
-              <a:cxn ang="0">
-                <a:pos x="connsiteX6" y="connsiteY6"/>
-              </a:cxn>
-              <a:cxn ang="0">
-                <a:pos x="connsiteX7" y="connsiteY7"/>
-              </a:cxn>
-              <a:cxn ang="0">
-                <a:pos x="connsiteX8" y="connsiteY8"/>
-              </a:cxn>
-              <a:cxn ang="0">
-                <a:pos x="connsiteX9" y="connsiteY9"/>
-              </a:cxn>
-              <a:cxn ang="0">
-                <a:pos x="connsiteX10" y="connsiteY10"/>
-              </a:cxn>
-              <a:cxn ang="0">
-                <a:pos x="connsiteX11" y="connsiteY11"/>
-              </a:cxn>
-              <a:cxn ang="0">
-                <a:pos x="connsiteX12" y="connsiteY12"/>
-              </a:cxn>
-              <a:cxn ang="0">
-                <a:pos x="connsiteX13" y="connsiteY13"/>
-              </a:cxn>
-              <a:cxn ang="0">
-                <a:pos x="connsiteX14" y="connsiteY14"/>
-              </a:cxn>
-              <a:cxn ang="0">
-                <a:pos x="connsiteX15" y="connsiteY15"/>
-              </a:cxn>
-              <a:cxn ang="0">
-                <a:pos x="connsiteX16" y="connsiteY16"/>
-              </a:cxn>
-              <a:cxn ang="0">
-                <a:pos x="connsiteX17" y="connsiteY17"/>
-              </a:cxn>
-              <a:cxn ang="0">
-                <a:pos x="connsiteX18" y="connsiteY18"/>
-              </a:cxn>
-              <a:cxn ang="0">
-                <a:pos x="connsiteX19" y="connsiteY19"/>
-              </a:cxn>
-              <a:cxn ang="0">
-                <a:pos x="connsiteX20" y="connsiteY20"/>
-              </a:cxn>
-              <a:cxn ang="0">
-                <a:pos x="connsiteX21" y="connsiteY21"/>
-              </a:cxn>
-              <a:cxn ang="0">
-                <a:pos x="connsiteX22" y="connsiteY22"/>
-              </a:cxn>
-              <a:cxn ang="0">
-                <a:pos x="connsiteX23" y="connsiteY23"/>
-              </a:cxn>
-              <a:cxn ang="0">
-                <a:pos x="connsiteX24" y="connsiteY24"/>
-              </a:cxn>
-              <a:cxn ang="0">
-                <a:pos x="connsiteX25" y="connsiteY25"/>
-              </a:cxn>
-              <a:cxn ang="0">
-                <a:pos x="connsiteX26" y="connsiteY26"/>
-              </a:cxn>
-              <a:cxn ang="0">
-                <a:pos x="connsiteX27" y="connsiteY27"/>
-              </a:cxn>
-              <a:cxn ang="0">
-                <a:pos x="connsiteX28" y="connsiteY28"/>
-              </a:cxn>
-              <a:cxn ang="0">
-                <a:pos x="connsiteX29" y="connsiteY29"/>
-              </a:cxn>
-              <a:cxn ang="0">
-                <a:pos x="connsiteX30" y="connsiteY30"/>
-              </a:cxn>
-              <a:cxn ang="0">
-                <a:pos x="connsiteX31" y="connsiteY31"/>
-              </a:cxn>
-              <a:cxn ang="0">
-                <a:pos x="connsiteX32" y="connsiteY32"/>
-              </a:cxn>
-              <a:cxn ang="0">
-                <a:pos x="connsiteX33" y="connsiteY33"/>
-              </a:cxn>
-              <a:cxn ang="0">
-                <a:pos x="connsiteX34" y="connsiteY34"/>
-              </a:cxn>
-              <a:cxn ang="0">
-                <a:pos x="connsiteX35" y="connsiteY35"/>
-              </a:cxn>
-              <a:cxn ang="0">
-                <a:pos x="connsiteX36" y="connsiteY36"/>
-              </a:cxn>
-              <a:cxn ang="0">
-                <a:pos x="connsiteX37" y="connsiteY37"/>
-              </a:cxn>
-              <a:cxn ang="0">
-                <a:pos x="connsiteX38" y="connsiteY38"/>
-              </a:cxn>
-              <a:cxn ang="0">
-                <a:pos x="connsiteX39" y="connsiteY39"/>
-              </a:cxn>
-              <a:cxn ang="0">
-                <a:pos x="connsiteX40" y="connsiteY40"/>
-              </a:cxn>
-              <a:cxn ang="0">
-                <a:pos x="connsiteX41" y="connsiteY41"/>
-              </a:cxn>
-              <a:cxn ang="0">
-                <a:pos x="connsiteX42" y="connsiteY42"/>
-              </a:cxn>
-              <a:cxn ang="0">
-                <a:pos x="connsiteX43" y="connsiteY43"/>
-              </a:cxn>
-              <a:cxn ang="0">
-                <a:pos x="connsiteX44" y="connsiteY44"/>
-              </a:cxn>
-              <a:cxn ang="0">
-                <a:pos x="connsiteX45" y="connsiteY45"/>
-              </a:cxn>
-              <a:cxn ang="0">
-                <a:pos x="connsiteX46" y="connsiteY46"/>
-              </a:cxn>
-              <a:cxn ang="0">
-                <a:pos x="connsiteX47" y="connsiteY47"/>
-              </a:cxn>
-              <a:cxn ang="0">
-                <a:pos x="connsiteX48" y="connsiteY48"/>
-              </a:cxn>
-              <a:cxn ang="0">
-                <a:pos x="connsiteX49" y="connsiteY49"/>
-              </a:cxn>
-              <a:cxn ang="0">
-                <a:pos x="connsiteX50" y="connsiteY50"/>
-              </a:cxn>
-              <a:cxn ang="0">
-                <a:pos x="connsiteX51" y="connsiteY51"/>
-              </a:cxn>
-              <a:cxn ang="0">
-                <a:pos x="connsiteX52" y="connsiteY52"/>
-              </a:cxn>
-              <a:cxn ang="0">
-                <a:pos x="connsiteX53" y="connsiteY53"/>
-              </a:cxn>
-              <a:cxn ang="0">
-                <a:pos x="connsiteX54" y="connsiteY54"/>
-              </a:cxn>
-              <a:cxn ang="0">
-                <a:pos x="connsiteX55" y="connsiteY55"/>
-              </a:cxn>
-              <a:cxn ang="0">
-                <a:pos x="connsiteX56" y="connsiteY56"/>
-              </a:cxn>
-              <a:cxn ang="0">
-                <a:pos x="connsiteX57" y="connsiteY57"/>
-              </a:cxn>
-              <a:cxn ang="0">
-                <a:pos x="connsiteX58" y="connsiteY58"/>
-              </a:cxn>
-              <a:cxn ang="0">
-                <a:pos x="connsiteX59" y="connsiteY59"/>
-              </a:cxn>
-              <a:cxn ang="0">
-                <a:pos x="connsiteX60" y="connsiteY60"/>
-              </a:cxn>
-              <a:cxn ang="0">
-                <a:pos x="connsiteX61" y="connsiteY61"/>
-              </a:cxn>
-              <a:cxn ang="0">
-                <a:pos x="connsiteX62" y="connsiteY62"/>
-              </a:cxn>
-              <a:cxn ang="0">
-                <a:pos x="connsiteX63" y="connsiteY63"/>
-              </a:cxn>
-              <a:cxn ang="0">
-                <a:pos x="connsiteX64" y="connsiteY64"/>
-              </a:cxn>
-              <a:cxn ang="0">
-                <a:pos x="connsiteX65" y="connsiteY65"/>
-              </a:cxn>
-              <a:cxn ang="0">
-                <a:pos x="connsiteX66" y="connsiteY66"/>
-              </a:cxn>
-              <a:cxn ang="0">
-                <a:pos x="connsiteX67" y="connsiteY67"/>
-              </a:cxn>
-              <a:cxn ang="0">
-                <a:pos x="connsiteX68" y="connsiteY68"/>
-              </a:cxn>
-              <a:cxn ang="0">
-                <a:pos x="connsiteX69" y="connsiteY69"/>
-              </a:cxn>
-              <a:cxn ang="0">
-                <a:pos x="connsiteX70" y="connsiteY70"/>
-              </a:cxn>
-              <a:cxn ang="0">
-                <a:pos x="connsiteX71" y="connsiteY71"/>
-              </a:cxn>
-              <a:cxn ang="0">
-                <a:pos x="connsiteX72" y="connsiteY72"/>
-              </a:cxn>
-              <a:cxn ang="0">
-                <a:pos x="connsiteX73" y="connsiteY73"/>
-              </a:cxn>
-            </a:cxnLst>
-            <a:rect l="l" t="t" r="r" b="b"/>
-            <a:pathLst>
-              <a:path w="1581150" h="1013572">
-                <a:moveTo>
-                  <a:pt x="342900" y="203947"/>
-                </a:moveTo>
-                <a:lnTo>
-                  <a:pt x="342900" y="203947"/>
-                </a:lnTo>
-                <a:cubicBezTo>
-                  <a:pt x="229545" y="178757"/>
-                  <a:pt x="211616" y="166814"/>
-                  <a:pt x="66675" y="194422"/>
-                </a:cubicBezTo>
-                <a:cubicBezTo>
-                  <a:pt x="56812" y="196301"/>
-                  <a:pt x="62131" y="214280"/>
-                  <a:pt x="57150" y="222997"/>
-                </a:cubicBezTo>
-                <a:cubicBezTo>
-                  <a:pt x="49274" y="236780"/>
-                  <a:pt x="38100" y="248397"/>
-                  <a:pt x="28575" y="261097"/>
-                </a:cubicBezTo>
-                <a:cubicBezTo>
-                  <a:pt x="31750" y="327772"/>
-                  <a:pt x="30729" y="394780"/>
-                  <a:pt x="38100" y="461122"/>
-                </a:cubicBezTo>
-                <a:cubicBezTo>
-                  <a:pt x="40318" y="481080"/>
-                  <a:pt x="50800" y="499222"/>
-                  <a:pt x="57150" y="518272"/>
-                </a:cubicBezTo>
-                <a:cubicBezTo>
-                  <a:pt x="60325" y="527797"/>
-                  <a:pt x="58321" y="541278"/>
-                  <a:pt x="66675" y="546847"/>
-                </a:cubicBezTo>
-                <a:lnTo>
-                  <a:pt x="95250" y="565897"/>
-                </a:lnTo>
-                <a:cubicBezTo>
-                  <a:pt x="82550" y="572247"/>
-                  <a:pt x="67190" y="574907"/>
-                  <a:pt x="57150" y="584947"/>
-                </a:cubicBezTo>
-                <a:cubicBezTo>
-                  <a:pt x="50050" y="592047"/>
-                  <a:pt x="52115" y="604542"/>
-                  <a:pt x="47625" y="613522"/>
-                </a:cubicBezTo>
-                <a:cubicBezTo>
-                  <a:pt x="42505" y="623761"/>
-                  <a:pt x="33224" y="631636"/>
-                  <a:pt x="28575" y="642097"/>
-                </a:cubicBezTo>
-                <a:cubicBezTo>
-                  <a:pt x="20420" y="660447"/>
-                  <a:pt x="15875" y="680197"/>
-                  <a:pt x="9525" y="699247"/>
-                </a:cubicBezTo>
-                <a:lnTo>
-                  <a:pt x="0" y="727822"/>
-                </a:lnTo>
-                <a:cubicBezTo>
-                  <a:pt x="3175" y="737347"/>
-                  <a:pt x="7090" y="746657"/>
-                  <a:pt x="9525" y="756397"/>
-                </a:cubicBezTo>
-                <a:cubicBezTo>
-                  <a:pt x="13452" y="772103"/>
-                  <a:pt x="12351" y="789284"/>
-                  <a:pt x="19050" y="804022"/>
-                </a:cubicBezTo>
-                <a:cubicBezTo>
-                  <a:pt x="28524" y="824865"/>
-                  <a:pt x="44450" y="842122"/>
-                  <a:pt x="57150" y="861172"/>
-                </a:cubicBezTo>
-                <a:cubicBezTo>
-                  <a:pt x="76200" y="889747"/>
-                  <a:pt x="73025" y="892922"/>
-                  <a:pt x="104775" y="908797"/>
-                </a:cubicBezTo>
-                <a:cubicBezTo>
-                  <a:pt x="183645" y="948232"/>
-                  <a:pt x="80033" y="882777"/>
-                  <a:pt x="161925" y="937372"/>
-                </a:cubicBezTo>
-                <a:cubicBezTo>
-                  <a:pt x="180975" y="934197"/>
-                  <a:pt x="200222" y="932037"/>
-                  <a:pt x="219075" y="927847"/>
-                </a:cubicBezTo>
-                <a:cubicBezTo>
-                  <a:pt x="228876" y="925669"/>
-                  <a:pt x="237996" y="921080"/>
-                  <a:pt x="247650" y="918322"/>
-                </a:cubicBezTo>
-                <a:cubicBezTo>
-                  <a:pt x="260237" y="914726"/>
-                  <a:pt x="273050" y="911972"/>
-                  <a:pt x="285750" y="908797"/>
-                </a:cubicBezTo>
-                <a:cubicBezTo>
-                  <a:pt x="301625" y="911972"/>
-                  <a:pt x="317756" y="914062"/>
-                  <a:pt x="333375" y="918322"/>
-                </a:cubicBezTo>
-                <a:cubicBezTo>
-                  <a:pt x="352748" y="923606"/>
-                  <a:pt x="390525" y="937372"/>
-                  <a:pt x="390525" y="937372"/>
-                </a:cubicBezTo>
-                <a:cubicBezTo>
-                  <a:pt x="400050" y="946897"/>
-                  <a:pt x="407325" y="959405"/>
-                  <a:pt x="419100" y="965947"/>
-                </a:cubicBezTo>
-                <a:cubicBezTo>
-                  <a:pt x="436653" y="975699"/>
-                  <a:pt x="457200" y="978647"/>
-                  <a:pt x="476250" y="984997"/>
-                </a:cubicBezTo>
-                <a:lnTo>
-                  <a:pt x="504825" y="994522"/>
-                </a:lnTo>
-                <a:cubicBezTo>
-                  <a:pt x="514350" y="997697"/>
-                  <a:pt x="523437" y="1002802"/>
-                  <a:pt x="533400" y="1004047"/>
-                </a:cubicBezTo>
-                <a:lnTo>
-                  <a:pt x="609600" y="1013572"/>
-                </a:lnTo>
-                <a:cubicBezTo>
-                  <a:pt x="644525" y="1010397"/>
-                  <a:pt x="679658" y="1009007"/>
-                  <a:pt x="714375" y="1004047"/>
-                </a:cubicBezTo>
-                <a:cubicBezTo>
-                  <a:pt x="724314" y="1002627"/>
-                  <a:pt x="733264" y="997164"/>
-                  <a:pt x="742950" y="994522"/>
-                </a:cubicBezTo>
-                <a:cubicBezTo>
-                  <a:pt x="861118" y="962294"/>
-                  <a:pt x="781953" y="987871"/>
-                  <a:pt x="847725" y="965947"/>
-                </a:cubicBezTo>
-                <a:cubicBezTo>
-                  <a:pt x="857357" y="951500"/>
-                  <a:pt x="876300" y="928515"/>
-                  <a:pt x="876300" y="908797"/>
-                </a:cubicBezTo>
-                <a:cubicBezTo>
-                  <a:pt x="876300" y="892608"/>
-                  <a:pt x="871035" y="876791"/>
-                  <a:pt x="866775" y="861172"/>
-                </a:cubicBezTo>
-                <a:cubicBezTo>
-                  <a:pt x="861491" y="841799"/>
-                  <a:pt x="847725" y="804022"/>
-                  <a:pt x="847725" y="804022"/>
-                </a:cubicBezTo>
-                <a:cubicBezTo>
-                  <a:pt x="970156" y="763212"/>
-                  <a:pt x="807040" y="814585"/>
-                  <a:pt x="1152525" y="784972"/>
-                </a:cubicBezTo>
-                <a:cubicBezTo>
-                  <a:pt x="1172532" y="783257"/>
-                  <a:pt x="1190194" y="770792"/>
-                  <a:pt x="1209675" y="765922"/>
-                </a:cubicBezTo>
-                <a:cubicBezTo>
-                  <a:pt x="1261550" y="752953"/>
-                  <a:pt x="1236066" y="762251"/>
-                  <a:pt x="1285875" y="737347"/>
-                </a:cubicBezTo>
-                <a:cubicBezTo>
-                  <a:pt x="1292225" y="727822"/>
-                  <a:pt x="1296310" y="716310"/>
-                  <a:pt x="1304925" y="708772"/>
-                </a:cubicBezTo>
-                <a:cubicBezTo>
-                  <a:pt x="1322155" y="693695"/>
-                  <a:pt x="1362075" y="670672"/>
-                  <a:pt x="1362075" y="670672"/>
-                </a:cubicBezTo>
-                <a:cubicBezTo>
-                  <a:pt x="1386016" y="598848"/>
-                  <a:pt x="1353721" y="687380"/>
-                  <a:pt x="1390650" y="613522"/>
-                </a:cubicBezTo>
-                <a:cubicBezTo>
-                  <a:pt x="1395140" y="604542"/>
-                  <a:pt x="1393903" y="592787"/>
-                  <a:pt x="1400175" y="584947"/>
-                </a:cubicBezTo>
-                <a:cubicBezTo>
-                  <a:pt x="1407326" y="576008"/>
-                  <a:pt x="1419225" y="572247"/>
-                  <a:pt x="1428750" y="565897"/>
-                </a:cubicBezTo>
-                <a:cubicBezTo>
-                  <a:pt x="1476375" y="581772"/>
-                  <a:pt x="1476375" y="594472"/>
-                  <a:pt x="1514475" y="575422"/>
-                </a:cubicBezTo>
-                <a:cubicBezTo>
-                  <a:pt x="1524714" y="570302"/>
-                  <a:pt x="1534256" y="563701"/>
-                  <a:pt x="1543050" y="556372"/>
-                </a:cubicBezTo>
-                <a:cubicBezTo>
-                  <a:pt x="1553398" y="547748"/>
-                  <a:pt x="1562100" y="537322"/>
-                  <a:pt x="1571625" y="527797"/>
-                </a:cubicBezTo>
-                <a:cubicBezTo>
-                  <a:pt x="1574800" y="518272"/>
-                  <a:pt x="1581150" y="509262"/>
-                  <a:pt x="1581150" y="499222"/>
-                </a:cubicBezTo>
-                <a:cubicBezTo>
-                  <a:pt x="1581150" y="370018"/>
-                  <a:pt x="1580995" y="422478"/>
-                  <a:pt x="1562100" y="356347"/>
-                </a:cubicBezTo>
-                <a:cubicBezTo>
-                  <a:pt x="1558504" y="343760"/>
-                  <a:pt x="1557172" y="330504"/>
-                  <a:pt x="1552575" y="318247"/>
-                </a:cubicBezTo>
-                <a:cubicBezTo>
-                  <a:pt x="1547589" y="304952"/>
-                  <a:pt x="1538798" y="293330"/>
-                  <a:pt x="1533525" y="280147"/>
-                </a:cubicBezTo>
-                <a:cubicBezTo>
-                  <a:pt x="1526067" y="261503"/>
-                  <a:pt x="1525614" y="239705"/>
-                  <a:pt x="1514475" y="222997"/>
-                </a:cubicBezTo>
-                <a:cubicBezTo>
-                  <a:pt x="1508125" y="213472"/>
-                  <a:pt x="1500545" y="204661"/>
-                  <a:pt x="1495425" y="194422"/>
-                </a:cubicBezTo>
-                <a:cubicBezTo>
-                  <a:pt x="1457762" y="119096"/>
-                  <a:pt x="1525036" y="218525"/>
-                  <a:pt x="1457325" y="137272"/>
-                </a:cubicBezTo>
-                <a:cubicBezTo>
-                  <a:pt x="1449996" y="128478"/>
-                  <a:pt x="1447214" y="115848"/>
-                  <a:pt x="1438275" y="108697"/>
-                </a:cubicBezTo>
-                <a:cubicBezTo>
-                  <a:pt x="1430435" y="102425"/>
-                  <a:pt x="1419629" y="100661"/>
-                  <a:pt x="1409700" y="99172"/>
-                </a:cubicBezTo>
-                <a:cubicBezTo>
-                  <a:pt x="1355954" y="91110"/>
-                  <a:pt x="1301750" y="86472"/>
-                  <a:pt x="1247775" y="80122"/>
-                </a:cubicBezTo>
-                <a:cubicBezTo>
-                  <a:pt x="1238250" y="73772"/>
-                  <a:pt x="1229439" y="66192"/>
-                  <a:pt x="1219200" y="61072"/>
-                </a:cubicBezTo>
-                <a:cubicBezTo>
-                  <a:pt x="1210220" y="56582"/>
-                  <a:pt x="1199402" y="56423"/>
-                  <a:pt x="1190625" y="51547"/>
-                </a:cubicBezTo>
-                <a:cubicBezTo>
-                  <a:pt x="1097840" y="0"/>
-                  <a:pt x="1169834" y="22537"/>
-                  <a:pt x="1095375" y="3922"/>
-                </a:cubicBezTo>
-                <a:cubicBezTo>
-                  <a:pt x="1035050" y="7097"/>
-                  <a:pt x="974581" y="8214"/>
-                  <a:pt x="914400" y="13447"/>
-                </a:cubicBezTo>
-                <a:cubicBezTo>
-                  <a:pt x="865789" y="17674"/>
-                  <a:pt x="884468" y="26599"/>
-                  <a:pt x="838200" y="42022"/>
-                </a:cubicBezTo>
-                <a:cubicBezTo>
-                  <a:pt x="813362" y="50301"/>
-                  <a:pt x="786838" y="52793"/>
-                  <a:pt x="762000" y="61072"/>
-                </a:cubicBezTo>
-                <a:cubicBezTo>
-                  <a:pt x="752475" y="64247"/>
-                  <a:pt x="742405" y="66107"/>
-                  <a:pt x="733425" y="70597"/>
-                </a:cubicBezTo>
-                <a:cubicBezTo>
-                  <a:pt x="659567" y="107526"/>
-                  <a:pt x="748099" y="75231"/>
-                  <a:pt x="676275" y="99172"/>
-                </a:cubicBezTo>
-                <a:cubicBezTo>
-                  <a:pt x="673100" y="108697"/>
-                  <a:pt x="673850" y="120647"/>
-                  <a:pt x="666750" y="127747"/>
-                </a:cubicBezTo>
-                <a:cubicBezTo>
-                  <a:pt x="640781" y="153716"/>
-                  <a:pt x="624633" y="128025"/>
-                  <a:pt x="609600" y="108697"/>
-                </a:cubicBezTo>
-                <a:cubicBezTo>
-                  <a:pt x="595544" y="90625"/>
-                  <a:pt x="584200" y="70597"/>
-                  <a:pt x="571500" y="51547"/>
-                </a:cubicBezTo>
-                <a:cubicBezTo>
-                  <a:pt x="565150" y="42022"/>
-                  <a:pt x="563310" y="26592"/>
-                  <a:pt x="552450" y="22972"/>
-                </a:cubicBezTo>
-                <a:lnTo>
-                  <a:pt x="523875" y="13447"/>
-                </a:lnTo>
-                <a:cubicBezTo>
-                  <a:pt x="463505" y="20155"/>
-                  <a:pt x="448574" y="17940"/>
-                  <a:pt x="400050" y="32497"/>
-                </a:cubicBezTo>
-                <a:cubicBezTo>
-                  <a:pt x="380816" y="38267"/>
-                  <a:pt x="359608" y="40408"/>
-                  <a:pt x="342900" y="51547"/>
-                </a:cubicBezTo>
-                <a:cubicBezTo>
-                  <a:pt x="305971" y="76166"/>
-                  <a:pt x="325185" y="66977"/>
-                  <a:pt x="285750" y="80122"/>
-                </a:cubicBezTo>
-                <a:cubicBezTo>
-                  <a:pt x="272531" y="119779"/>
-                  <a:pt x="271957" y="105748"/>
-                  <a:pt x="285750" y="156322"/>
-                </a:cubicBezTo>
-                <a:cubicBezTo>
-                  <a:pt x="302979" y="219496"/>
-                  <a:pt x="333375" y="196010"/>
-                  <a:pt x="342900" y="203947"/>
-                </a:cubicBezTo>
-                <a:close/>
-              </a:path>
-            </a:pathLst>
-          </a:custGeom>
-          <a:scene3d>
-            <a:camera prst="perspectiveContrastingRightFacing"/>
-            <a:lightRig rig="balanced" dir="t"/>
-          </a:scene3d>
-          <a:sp3d prstMaterial="translucentPowder">
-            <a:bevelT/>
-          </a:sp3d>
-        </p:spPr>
-        <p:style>
-          <a:lnRef idx="1">
-            <a:schemeClr val="dk1"/>
-          </a:lnRef>
-          <a:fillRef idx="2">
-            <a:schemeClr val="dk1"/>
-          </a:fillRef>
-          <a:effectRef idx="1">
-            <a:schemeClr val="dk1"/>
-          </a:effectRef>
-          <a:fontRef idx="minor">
-            <a:schemeClr val="dk1"/>
-          </a:fontRef>
-        </p:style>
-        <p:txBody>
-          <a:bodyPr rtlCol="0" anchor="ctr"/>
-          <a:lstStyle/>
-          <a:p>
-            <a:pPr algn="ctr"/>
-            <a:r>
-              <a:rPr lang="de-DE" dirty="0" smtClean="0"/>
-              <a:t>Network</a:t>
-            </a:r>
-            <a:endParaRPr lang="de-DE" dirty="0"/>
-          </a:p>
-        </p:txBody>
-      </p:sp>
       <p:cxnSp>
         <p:nvCxnSpPr>
           <p:cNvPr id="25" name="Gerade Verbindung mit Pfeil 24"/>
@@ -5308,6 +4522,172 @@
               <a:t>Cloud Blob Storage</a:t>
             </a:r>
             <a:endParaRPr lang="de-DE" dirty="0"/>
+          </a:p>
+        </p:txBody>
+      </p:sp>
+      <p:sp>
+        <p:nvSpPr>
+          <p:cNvPr id="12" name="Wolke 11"/>
+          <p:cNvSpPr/>
+          <p:nvPr/>
+        </p:nvSpPr>
+        <p:spPr>
+          <a:xfrm>
+            <a:off x="3357554" y="571480"/>
+            <a:ext cx="2000264" cy="2000264"/>
+          </a:xfrm>
+          <a:prstGeom prst="cloud">
+            <a:avLst/>
+          </a:prstGeom>
+          <a:solidFill>
+            <a:schemeClr val="bg1">
+              <a:lumMod val="95000"/>
+            </a:schemeClr>
+          </a:solidFill>
+          <a:ln>
+            <a:solidFill>
+              <a:schemeClr val="tx1">
+                <a:lumMod val="65000"/>
+                <a:lumOff val="35000"/>
+              </a:schemeClr>
+            </a:solidFill>
+          </a:ln>
+          <a:scene3d>
+            <a:camera prst="isometricRightUp"/>
+            <a:lightRig rig="threePt" dir="t"/>
+          </a:scene3d>
+          <a:sp3d prstMaterial="clear">
+            <a:bevelT h="95250"/>
+          </a:sp3d>
+        </p:spPr>
+        <p:style>
+          <a:lnRef idx="2">
+            <a:schemeClr val="accent1">
+              <a:shade val="50000"/>
+            </a:schemeClr>
+          </a:lnRef>
+          <a:fillRef idx="1">
+            <a:schemeClr val="accent1"/>
+          </a:fillRef>
+          <a:effectRef idx="0">
+            <a:schemeClr val="accent1"/>
+          </a:effectRef>
+          <a:fontRef idx="minor">
+            <a:schemeClr val="lt1"/>
+          </a:fontRef>
+        </p:style>
+        <p:txBody>
+          <a:bodyPr rtlCol="0" anchor="ctr"/>
+          <a:lstStyle>
+            <a:defPPr>
+              <a:defRPr lang="de-DE"/>
+            </a:defPPr>
+            <a:lvl1pPr marL="0" algn="l" defTabSz="914400" rtl="0" eaLnBrk="1" latinLnBrk="0" hangingPunct="1">
+              <a:defRPr sz="1800" kern="1200">
+                <a:solidFill>
+                  <a:schemeClr val="lt1"/>
+                </a:solidFill>
+                <a:latin typeface="+mn-lt"/>
+                <a:ea typeface="+mn-ea"/>
+                <a:cs typeface="+mn-cs"/>
+              </a:defRPr>
+            </a:lvl1pPr>
+            <a:lvl2pPr marL="457200" algn="l" defTabSz="914400" rtl="0" eaLnBrk="1" latinLnBrk="0" hangingPunct="1">
+              <a:defRPr sz="1800" kern="1200">
+                <a:solidFill>
+                  <a:schemeClr val="lt1"/>
+                </a:solidFill>
+                <a:latin typeface="+mn-lt"/>
+                <a:ea typeface="+mn-ea"/>
+                <a:cs typeface="+mn-cs"/>
+              </a:defRPr>
+            </a:lvl2pPr>
+            <a:lvl3pPr marL="914400" algn="l" defTabSz="914400" rtl="0" eaLnBrk="1" latinLnBrk="0" hangingPunct="1">
+              <a:defRPr sz="1800" kern="1200">
+                <a:solidFill>
+                  <a:schemeClr val="lt1"/>
+                </a:solidFill>
+                <a:latin typeface="+mn-lt"/>
+                <a:ea typeface="+mn-ea"/>
+                <a:cs typeface="+mn-cs"/>
+              </a:defRPr>
+            </a:lvl3pPr>
+            <a:lvl4pPr marL="1371600" algn="l" defTabSz="914400" rtl="0" eaLnBrk="1" latinLnBrk="0" hangingPunct="1">
+              <a:defRPr sz="1800" kern="1200">
+                <a:solidFill>
+                  <a:schemeClr val="lt1"/>
+                </a:solidFill>
+                <a:latin typeface="+mn-lt"/>
+                <a:ea typeface="+mn-ea"/>
+                <a:cs typeface="+mn-cs"/>
+              </a:defRPr>
+            </a:lvl4pPr>
+            <a:lvl5pPr marL="1828800" algn="l" defTabSz="914400" rtl="0" eaLnBrk="1" latinLnBrk="0" hangingPunct="1">
+              <a:defRPr sz="1800" kern="1200">
+                <a:solidFill>
+                  <a:schemeClr val="lt1"/>
+                </a:solidFill>
+                <a:latin typeface="+mn-lt"/>
+                <a:ea typeface="+mn-ea"/>
+                <a:cs typeface="+mn-cs"/>
+              </a:defRPr>
+            </a:lvl5pPr>
+            <a:lvl6pPr marL="2286000" algn="l" defTabSz="914400" rtl="0" eaLnBrk="1" latinLnBrk="0" hangingPunct="1">
+              <a:defRPr sz="1800" kern="1200">
+                <a:solidFill>
+                  <a:schemeClr val="lt1"/>
+                </a:solidFill>
+                <a:latin typeface="+mn-lt"/>
+                <a:ea typeface="+mn-ea"/>
+                <a:cs typeface="+mn-cs"/>
+              </a:defRPr>
+            </a:lvl6pPr>
+            <a:lvl7pPr marL="2743200" algn="l" defTabSz="914400" rtl="0" eaLnBrk="1" latinLnBrk="0" hangingPunct="1">
+              <a:defRPr sz="1800" kern="1200">
+                <a:solidFill>
+                  <a:schemeClr val="lt1"/>
+                </a:solidFill>
+                <a:latin typeface="+mn-lt"/>
+                <a:ea typeface="+mn-ea"/>
+                <a:cs typeface="+mn-cs"/>
+              </a:defRPr>
+            </a:lvl7pPr>
+            <a:lvl8pPr marL="3200400" algn="l" defTabSz="914400" rtl="0" eaLnBrk="1" latinLnBrk="0" hangingPunct="1">
+              <a:defRPr sz="1800" kern="1200">
+                <a:solidFill>
+                  <a:schemeClr val="lt1"/>
+                </a:solidFill>
+                <a:latin typeface="+mn-lt"/>
+                <a:ea typeface="+mn-ea"/>
+                <a:cs typeface="+mn-cs"/>
+              </a:defRPr>
+            </a:lvl8pPr>
+            <a:lvl9pPr marL="3657600" algn="l" defTabSz="914400" rtl="0" eaLnBrk="1" latinLnBrk="0" hangingPunct="1">
+              <a:defRPr sz="1800" kern="1200">
+                <a:solidFill>
+                  <a:schemeClr val="lt1"/>
+                </a:solidFill>
+                <a:latin typeface="+mn-lt"/>
+                <a:ea typeface="+mn-ea"/>
+                <a:cs typeface="+mn-cs"/>
+              </a:defRPr>
+            </a:lvl9pPr>
+          </a:lstStyle>
+          <a:p>
+            <a:pPr algn="ctr"/>
+            <a:r>
+              <a:rPr lang="de-DE" dirty="0" smtClean="0">
+                <a:solidFill>
+                  <a:schemeClr val="tx1"/>
+                </a:solidFill>
+              </a:rPr>
+              <a:t>Internet</a:t>
+            </a:r>
+            <a:endParaRPr lang="de-DE" dirty="0">
+              <a:solidFill>
+                <a:schemeClr val="tx1"/>
+              </a:solidFill>
+            </a:endParaRPr>
           </a:p>
         </p:txBody>
       </p:sp>

</xml_diff>